<commit_message>
finish branch and pull request section
</commit_message>
<xml_diff>
--- a/images/branch_merge.pptx
+++ b/images/branch_merge.pptx
@@ -3335,8 +3335,8 @@
         </p:nvSpPr>
         <p:spPr>
           <a:xfrm>
-            <a:off x="4093534" y="4724400"/>
-            <a:ext cx="3646968" cy="999461"/>
+            <a:off x="2496065" y="4724400"/>
+            <a:ext cx="6635577" cy="1453978"/>
           </a:xfrm>
           <a:prstGeom prst="rect">
             <a:avLst/>
@@ -3387,8 +3387,8 @@
         </p:nvSpPr>
         <p:spPr>
           <a:xfrm>
-            <a:off x="1935125" y="2519916"/>
-            <a:ext cx="8910084" cy="999461"/>
+            <a:off x="1935125" y="1841158"/>
+            <a:ext cx="9148886" cy="1678220"/>
           </a:xfrm>
           <a:prstGeom prst="rect">
             <a:avLst/>
@@ -4174,8 +4174,8 @@
         </p:nvSpPr>
         <p:spPr>
           <a:xfrm>
-            <a:off x="669851" y="2647507"/>
-            <a:ext cx="874663" cy="646331"/>
+            <a:off x="304926" y="2400372"/>
+            <a:ext cx="1629229" cy="646331"/>
           </a:xfrm>
           <a:prstGeom prst="rect">
             <a:avLst/>
@@ -4191,7 +4191,7 @@
             <a:pPr algn="ctr"/>
             <a:r>
               <a:rPr lang="en-US" dirty="0"/>
-              <a:t>Master</a:t>
+              <a:t>Master Branch</a:t>
             </a:r>
           </a:p>
           <a:p>
@@ -4217,8 +4217,8 @@
         </p:nvSpPr>
         <p:spPr>
           <a:xfrm>
-            <a:off x="2693832" y="4774688"/>
-            <a:ext cx="1208088" cy="646331"/>
+            <a:off x="197767" y="5207175"/>
+            <a:ext cx="2150018" cy="369332"/>
           </a:xfrm>
           <a:prstGeom prst="rect">
             <a:avLst/>
@@ -4226,7 +4226,7 @@
           <a:noFill/>
         </p:spPr>
         <p:txBody>
-          <a:bodyPr wrap="none" rtlCol="0">
+          <a:bodyPr wrap="square" rtlCol="0">
             <a:spAutoFit/>
           </a:bodyPr>
           <a:lstStyle/>
@@ -4234,14 +4234,7 @@
             <a:pPr algn="ctr"/>
             <a:r>
               <a:rPr lang="en-US" dirty="0"/>
-              <a:t>Instructor </a:t>
-            </a:r>
-          </a:p>
-          <a:p>
-            <a:pPr algn="ctr"/>
-            <a:r>
-              <a:rPr lang="en-US" dirty="0"/>
-              <a:t>Branch</a:t>
+              <a:t>Instructor Branch</a:t>
             </a:r>
           </a:p>
         </p:txBody>
@@ -4259,9 +4252,9 @@
           <p:nvPr/>
         </p:nvSpPr>
         <p:spPr>
-          <a:xfrm rot="4161118">
-            <a:off x="3360221" y="4013944"/>
-            <a:ext cx="1676677" cy="646331"/>
+          <a:xfrm>
+            <a:off x="1922313" y="3840947"/>
+            <a:ext cx="2495748" cy="646331"/>
           </a:xfrm>
           <a:prstGeom prst="rect">
             <a:avLst/>
@@ -4274,15 +4267,17 @@
           </a:bodyPr>
           <a:lstStyle/>
           <a:p>
+            <a:pPr algn="r"/>
             <a:r>
               <a:rPr lang="en-US" dirty="0"/>
-              <a:t>Instructor</a:t>
-            </a:r>
-          </a:p>
-          <a:p>
+              <a:t>(Instructor)</a:t>
+            </a:r>
+          </a:p>
+          <a:p>
+            <a:pPr algn="r"/>
             <a:r>
               <a:rPr lang="en-US" dirty="0"/>
-              <a:t>creates branch</a:t>
+              <a:t>Message create branch</a:t>
             </a:r>
           </a:p>
         </p:txBody>
@@ -4301,8 +4296,8 @@
         </p:nvSpPr>
         <p:spPr>
           <a:xfrm>
-            <a:off x="5224130" y="4671237"/>
-            <a:ext cx="2350562" cy="646331"/>
+            <a:off x="5187059" y="5449712"/>
+            <a:ext cx="1992217" cy="646331"/>
           </a:xfrm>
           <a:prstGeom prst="rect">
             <a:avLst/>
@@ -4317,7 +4312,7 @@
           <a:p>
             <a:r>
               <a:rPr lang="en-US" dirty="0"/>
-              <a:t>Instructor suggests edits on problem</a:t>
+              <a:t>Instructor makes edits on problem</a:t>
             </a:r>
           </a:p>
         </p:txBody>
@@ -4335,9 +4330,9 @@
           <p:nvPr/>
         </p:nvSpPr>
         <p:spPr>
-          <a:xfrm rot="18230291">
-            <a:off x="7328897" y="3785670"/>
-            <a:ext cx="1901600" cy="646331"/>
+          <a:xfrm>
+            <a:off x="9553114" y="3847456"/>
+            <a:ext cx="2470011" cy="646331"/>
           </a:xfrm>
           <a:prstGeom prst="rect">
             <a:avLst/>
@@ -4352,7 +4347,7 @@
           <a:p>
             <a:r>
               <a:rPr lang="en-US" dirty="0"/>
-              <a:t>Instructor makes pull request</a:t>
+              <a:t>(Instructor) pull request with message</a:t>
             </a:r>
           </a:p>
         </p:txBody>
@@ -4371,8 +4366,8 @@
         </p:nvSpPr>
         <p:spPr>
           <a:xfrm>
-            <a:off x="8033232" y="2537638"/>
-            <a:ext cx="2210519" cy="369332"/>
+            <a:off x="8045588" y="2241075"/>
+            <a:ext cx="2964282" cy="369332"/>
           </a:xfrm>
           <a:prstGeom prst="rect">
             <a:avLst/>
@@ -4387,7 +4382,7 @@
           <a:p>
             <a:r>
               <a:rPr lang="en-US" dirty="0"/>
-              <a:t>You merge changes</a:t>
+              <a:t>(You) review diffs and merge</a:t>
             </a:r>
           </a:p>
         </p:txBody>
@@ -4406,7 +4401,7 @@
         </p:nvSpPr>
         <p:spPr>
           <a:xfrm>
-            <a:off x="3929449" y="1964723"/>
+            <a:off x="3496962" y="2113005"/>
             <a:ext cx="1075038" cy="679623"/>
           </a:xfrm>
           <a:prstGeom prst="wedgeEllipseCallout">
@@ -4455,6 +4450,245 @@
                 </a:solidFill>
               </a:rPr>
               <a:t>Help!</a:t>
+            </a:r>
+          </a:p>
+        </p:txBody>
+      </p:sp>
+      <p:sp>
+        <p:nvSpPr>
+          <p:cNvPr id="37" name="TextBox 36">
+            <a:extLst>
+              <a:ext uri="{FF2B5EF4-FFF2-40B4-BE49-F238E27FC236}">
+                <a16:creationId xmlns:a16="http://schemas.microsoft.com/office/drawing/2014/main" id="{BB1381DB-5C02-F748-EA4F-B7763D2AC278}"/>
+              </a:ext>
+            </a:extLst>
+          </p:cNvPr>
+          <p:cNvSpPr txBox="1"/>
+          <p:nvPr/>
+        </p:nvSpPr>
+        <p:spPr>
+          <a:xfrm>
+            <a:off x="2180250" y="2171054"/>
+            <a:ext cx="1390854" cy="646331"/>
+          </a:xfrm>
+          <a:prstGeom prst="rect">
+            <a:avLst/>
+          </a:prstGeom>
+          <a:noFill/>
+        </p:spPr>
+        <p:txBody>
+          <a:bodyPr wrap="square" rtlCol="0">
+            <a:spAutoFit/>
+          </a:bodyPr>
+          <a:lstStyle/>
+          <a:p>
+            <a:r>
+              <a:rPr lang="en-US" dirty="0"/>
+              <a:t>(You) create new issue</a:t>
+            </a:r>
+          </a:p>
+        </p:txBody>
+      </p:sp>
+      <p:sp>
+        <p:nvSpPr>
+          <p:cNvPr id="38" name="TextBox 37">
+            <a:extLst>
+              <a:ext uri="{FF2B5EF4-FFF2-40B4-BE49-F238E27FC236}">
+                <a16:creationId xmlns:a16="http://schemas.microsoft.com/office/drawing/2014/main" id="{487C7E39-754E-9371-0A84-991185AA48B1}"/>
+              </a:ext>
+            </a:extLst>
+          </p:cNvPr>
+          <p:cNvSpPr txBox="1"/>
+          <p:nvPr/>
+        </p:nvSpPr>
+        <p:spPr>
+          <a:xfrm>
+            <a:off x="5121156" y="2245193"/>
+            <a:ext cx="2803644" cy="646331"/>
+          </a:xfrm>
+          <a:prstGeom prst="rect">
+            <a:avLst/>
+          </a:prstGeom>
+          <a:noFill/>
+        </p:spPr>
+        <p:txBody>
+          <a:bodyPr wrap="square" rtlCol="0">
+            <a:spAutoFit/>
+          </a:bodyPr>
+          <a:lstStyle/>
+          <a:p>
+            <a:r>
+              <a:rPr lang="en-US" dirty="0"/>
+              <a:t>(You) can keep working on other parts of code</a:t>
+            </a:r>
+          </a:p>
+        </p:txBody>
+      </p:sp>
+      <p:sp>
+        <p:nvSpPr>
+          <p:cNvPr id="39" name="Oval Callout 38">
+            <a:extLst>
+              <a:ext uri="{FF2B5EF4-FFF2-40B4-BE49-F238E27FC236}">
+                <a16:creationId xmlns:a16="http://schemas.microsoft.com/office/drawing/2014/main" id="{6B54CF2A-F484-7C19-4311-D6470D38AA88}"/>
+              </a:ext>
+            </a:extLst>
+          </p:cNvPr>
+          <p:cNvSpPr/>
+          <p:nvPr/>
+        </p:nvSpPr>
+        <p:spPr>
+          <a:xfrm>
+            <a:off x="4600832" y="3657601"/>
+            <a:ext cx="1762899" cy="782595"/>
+          </a:xfrm>
+          <a:prstGeom prst="wedgeEllipseCallout">
+            <a:avLst>
+              <a:gd name="adj1" fmla="val -48813"/>
+              <a:gd name="adj2" fmla="val 59058"/>
+            </a:avLst>
+          </a:prstGeom>
+          <a:solidFill>
+            <a:schemeClr val="accent2">
+              <a:lumMod val="20000"/>
+              <a:lumOff val="80000"/>
+            </a:schemeClr>
+          </a:solidFill>
+          <a:ln>
+            <a:solidFill>
+              <a:schemeClr val="tx1"/>
+            </a:solidFill>
+          </a:ln>
+        </p:spPr>
+        <p:style>
+          <a:lnRef idx="2">
+            <a:schemeClr val="accent1">
+              <a:shade val="15000"/>
+            </a:schemeClr>
+          </a:lnRef>
+          <a:fillRef idx="1">
+            <a:schemeClr val="accent1"/>
+          </a:fillRef>
+          <a:effectRef idx="0">
+            <a:schemeClr val="accent1"/>
+          </a:effectRef>
+          <a:fontRef idx="minor">
+            <a:schemeClr val="lt1"/>
+          </a:fontRef>
+        </p:style>
+        <p:txBody>
+          <a:bodyPr rtlCol="0" anchor="ctr"/>
+          <a:lstStyle/>
+          <a:p>
+            <a:pPr algn="ctr"/>
+            <a:r>
+              <a:rPr lang="en-US" dirty="0">
+                <a:solidFill>
+                  <a:sysClr val="windowText" lastClr="000000"/>
+                </a:solidFill>
+              </a:rPr>
+              <a:t>Ok I’ll take a look</a:t>
+            </a:r>
+          </a:p>
+        </p:txBody>
+      </p:sp>
+      <p:sp>
+        <p:nvSpPr>
+          <p:cNvPr id="40" name="Oval Callout 39">
+            <a:extLst>
+              <a:ext uri="{FF2B5EF4-FFF2-40B4-BE49-F238E27FC236}">
+                <a16:creationId xmlns:a16="http://schemas.microsoft.com/office/drawing/2014/main" id="{2476965B-BEF0-E3BA-5936-1DAFFE0CEFA6}"/>
+              </a:ext>
+            </a:extLst>
+          </p:cNvPr>
+          <p:cNvSpPr/>
+          <p:nvPr/>
+        </p:nvSpPr>
+        <p:spPr>
+          <a:xfrm>
+            <a:off x="7706497" y="3637007"/>
+            <a:ext cx="1919417" cy="782595"/>
+          </a:xfrm>
+          <a:prstGeom prst="wedgeEllipseCallout">
+            <a:avLst>
+              <a:gd name="adj1" fmla="val -48813"/>
+              <a:gd name="adj2" fmla="val 59058"/>
+            </a:avLst>
+          </a:prstGeom>
+          <a:solidFill>
+            <a:schemeClr val="accent2">
+              <a:lumMod val="20000"/>
+              <a:lumOff val="80000"/>
+            </a:schemeClr>
+          </a:solidFill>
+          <a:ln>
+            <a:solidFill>
+              <a:schemeClr val="tx1"/>
+            </a:solidFill>
+          </a:ln>
+        </p:spPr>
+        <p:style>
+          <a:lnRef idx="2">
+            <a:schemeClr val="accent1">
+              <a:shade val="15000"/>
+            </a:schemeClr>
+          </a:lnRef>
+          <a:fillRef idx="1">
+            <a:schemeClr val="accent1"/>
+          </a:fillRef>
+          <a:effectRef idx="0">
+            <a:schemeClr val="accent1"/>
+          </a:effectRef>
+          <a:fontRef idx="minor">
+            <a:schemeClr val="lt1"/>
+          </a:fontRef>
+        </p:style>
+        <p:txBody>
+          <a:bodyPr rtlCol="0" anchor="ctr"/>
+          <a:lstStyle/>
+          <a:p>
+            <a:pPr algn="ctr"/>
+            <a:r>
+              <a:rPr lang="en-US" dirty="0">
+                <a:solidFill>
+                  <a:sysClr val="windowText" lastClr="000000"/>
+                </a:solidFill>
+              </a:rPr>
+              <a:t>Here’s a way to fix it</a:t>
+            </a:r>
+          </a:p>
+        </p:txBody>
+      </p:sp>
+      <p:sp>
+        <p:nvSpPr>
+          <p:cNvPr id="41" name="TextBox 40">
+            <a:extLst>
+              <a:ext uri="{FF2B5EF4-FFF2-40B4-BE49-F238E27FC236}">
+                <a16:creationId xmlns:a16="http://schemas.microsoft.com/office/drawing/2014/main" id="{9FE14D37-3362-3256-8294-AF79540B0C3C}"/>
+              </a:ext>
+            </a:extLst>
+          </p:cNvPr>
+          <p:cNvSpPr txBox="1"/>
+          <p:nvPr/>
+        </p:nvSpPr>
+        <p:spPr>
+          <a:xfrm>
+            <a:off x="3534032" y="902042"/>
+            <a:ext cx="5197320" cy="461665"/>
+          </a:xfrm>
+          <a:prstGeom prst="rect">
+            <a:avLst/>
+          </a:prstGeom>
+          <a:noFill/>
+        </p:spPr>
+        <p:txBody>
+          <a:bodyPr wrap="none" rtlCol="0">
+            <a:spAutoFit/>
+          </a:bodyPr>
+          <a:lstStyle/>
+          <a:p>
+            <a:r>
+              <a:rPr lang="en-US" sz="2400" dirty="0"/>
+              <a:t>How we will work together (hopefully!)</a:t>
             </a:r>
           </a:p>
         </p:txBody>

</xml_diff>